<commit_message>
Add extra image in taskrunner slide
</commit_message>
<xml_diff>
--- a/React SIG 3 slides.pptx
+++ b/React SIG 3 slides.pptx
@@ -127,6 +127,11 @@
       </a:defRPr>
     </a:lvl9pPr>
   </p:defaultTextStyle>
+  <p:extLst>
+    <p:ext uri="{EFAFB233-063F-42B5-8137-9DF3F51BA10A}">
+      <p15:sldGuideLst xmlns:p15="http://schemas.microsoft.com/office/powerpoint/2012/main"/>
+    </p:ext>
+  </p:extLst>
 </p:presentation>
 </file>
 
@@ -530,11 +535,7 @@
             </a:r>
             <a:r>
               <a:rPr lang="nl-NL" dirty="0" err="1"/>
-              <a:t>npm</a:t>
-            </a:r>
-            <a:r>
-              <a:rPr lang="nl-NL" dirty="0"/>
-              <a:t> run ….</a:t>
+              <a:t>Package.json</a:t>
             </a:r>
             <a:endParaRPr lang="en-NL" dirty="0"/>
           </a:p>
@@ -622,15 +623,7 @@
           <a:p>
             <a:r>
               <a:rPr lang="nl-NL" dirty="0"/>
-              <a:t>Parcel hobby weinig </a:t>
-            </a:r>
-            <a:r>
-              <a:rPr lang="nl-NL" dirty="0" err="1"/>
-              <a:t>configuties</a:t>
-            </a:r>
-            <a:r>
-              <a:rPr lang="nl-NL" dirty="0"/>
-              <a:t> nodig; </a:t>
+              <a:t>Parcel hobbyproject weinig configuraties nodig; </a:t>
             </a:r>
             <a:r>
               <a:rPr lang="nl-NL" dirty="0" err="1"/>
@@ -639,6 +632,14 @@
             <a:r>
               <a:rPr lang="nl-NL" dirty="0"/>
               <a:t> productie project; </a:t>
+            </a:r>
+            <a:r>
+              <a:rPr lang="nl-NL" dirty="0" err="1"/>
+              <a:t>rollup</a:t>
+            </a:r>
+            <a:r>
+              <a:rPr lang="nl-NL" dirty="0"/>
+              <a:t> </a:t>
             </a:r>
             <a:r>
               <a:rPr lang="nl-NL" dirty="0" err="1"/>
@@ -12883,7 +12884,7 @@
         </p:blipFill>
         <p:spPr>
           <a:xfrm>
-            <a:off x="5211720" y="1019880"/>
+            <a:off x="5576940" y="613621"/>
             <a:ext cx="2010960" cy="1266120"/>
           </a:xfrm>
           <a:prstGeom prst="rect">
@@ -12906,7 +12907,7 @@
         </p:blipFill>
         <p:spPr>
           <a:xfrm>
-            <a:off x="4589280" y="1097280"/>
+            <a:off x="4434660" y="762660"/>
             <a:ext cx="1262880" cy="1174680"/>
           </a:xfrm>
           <a:prstGeom prst="rect">
@@ -12915,6 +12916,42 @@
           <a:ln>
             <a:noFill/>
           </a:ln>
+        </p:spPr>
+      </p:pic>
+      <p:pic>
+        <p:nvPicPr>
+          <p:cNvPr id="3" name="Afbeelding 2">
+            <a:extLst>
+              <a:ext uri="{FF2B5EF4-FFF2-40B4-BE49-F238E27FC236}">
+                <a16:creationId xmlns:a16="http://schemas.microsoft.com/office/drawing/2014/main" id="{8EF4FBF4-2322-4FAE-BC04-D8A5A98C7243}"/>
+              </a:ext>
+            </a:extLst>
+          </p:cNvPr>
+          <p:cNvPicPr>
+            <a:picLocks noChangeAspect="1"/>
+          </p:cNvPicPr>
+          <p:nvPr/>
+        </p:nvPicPr>
+        <p:blipFill>
+          <a:blip r:embed="rId4">
+            <a:extLst>
+              <a:ext uri="{28A0092B-C50C-407E-A947-70E740481C1C}">
+                <a14:useLocalDpi xmlns:a14="http://schemas.microsoft.com/office/drawing/2010/main" val="0"/>
+              </a:ext>
+            </a:extLst>
+          </a:blip>
+          <a:stretch>
+            <a:fillRect/>
+          </a:stretch>
+        </p:blipFill>
+        <p:spPr>
+          <a:xfrm>
+            <a:off x="4411599" y="2305239"/>
+            <a:ext cx="3299853" cy="1954282"/>
+          </a:xfrm>
+          <a:prstGeom prst="rect">
+            <a:avLst/>
+          </a:prstGeom>
         </p:spPr>
       </p:pic>
     </p:spTree>
@@ -13010,7 +13047,7 @@
               </a:lnSpc>
             </a:pPr>
             <a:r>
-              <a:rPr lang="en-US" sz="1800" b="1" strike="noStrike" spc="-1">
+              <a:rPr lang="en-US" sz="1800" b="1" strike="noStrike" spc="-1" dirty="0">
                 <a:solidFill>
                   <a:srgbClr val="E63232"/>
                 </a:solidFill>
@@ -13019,7 +13056,7 @@
               </a:rPr>
               <a:t>NPM</a:t>
             </a:r>
-            <a:endParaRPr lang="en-US" sz="1800" b="0" strike="noStrike" spc="-1">
+            <a:endParaRPr lang="en-US" sz="1800" b="0" strike="noStrike" spc="-1" dirty="0">
               <a:latin typeface="Arial"/>
             </a:endParaRPr>
           </a:p>
@@ -13240,7 +13277,7 @@
               <a:buChar char=""/>
             </a:pPr>
             <a:r>
-              <a:rPr lang="en-US" sz="1800" b="0" strike="noStrike" spc="-1">
+              <a:rPr lang="en-US" sz="1800" b="0" strike="noStrike" spc="-1" dirty="0">
                 <a:latin typeface="Arial"/>
               </a:rPr>
               <a:t>Dependencies</a:t>
@@ -13252,7 +13289,7 @@
                 <a:spcPct val="100000"/>
               </a:lnSpc>
             </a:pPr>
-            <a:endParaRPr lang="en-US" sz="1800" b="0" strike="noStrike" spc="-1">
+            <a:endParaRPr lang="en-US" sz="1800" b="0" strike="noStrike" spc="-1" dirty="0">
               <a:latin typeface="Arial"/>
             </a:endParaRPr>
           </a:p>
@@ -13269,7 +13306,7 @@
               <a:buChar char=""/>
             </a:pPr>
             <a:r>
-              <a:rPr lang="en-US" sz="1800" b="0" strike="noStrike" spc="-1">
+              <a:rPr lang="en-US" sz="1800" b="0" strike="noStrike" spc="-1" dirty="0">
                 <a:latin typeface="Arial"/>
               </a:rPr>
               <a:t>Scripts</a:t>
@@ -13281,7 +13318,7 @@
                 <a:spcPct val="100000"/>
               </a:lnSpc>
             </a:pPr>
-            <a:endParaRPr lang="en-US" sz="1800" b="0" strike="noStrike" spc="-1">
+            <a:endParaRPr lang="en-US" sz="1800" b="0" strike="noStrike" spc="-1" dirty="0">
               <a:latin typeface="Arial"/>
             </a:endParaRPr>
           </a:p>
@@ -13298,7 +13335,7 @@
               <a:buChar char=""/>
             </a:pPr>
             <a:r>
-              <a:rPr lang="en-US" sz="1800" b="0" strike="noStrike" spc="-1">
+              <a:rPr lang="en-US" sz="1800" b="0" strike="noStrike" spc="-1" dirty="0">
                 <a:latin typeface="Arial"/>
               </a:rPr>
               <a:t>Config</a:t>
@@ -13310,7 +13347,7 @@
                 <a:spcPct val="100000"/>
               </a:lnSpc>
             </a:pPr>
-            <a:endParaRPr lang="en-US" sz="1800" b="0" strike="noStrike" spc="-1">
+            <a:endParaRPr lang="en-US" sz="1800" b="0" strike="noStrike" spc="-1" dirty="0">
               <a:latin typeface="Arial"/>
             </a:endParaRPr>
           </a:p>
@@ -13327,7 +13364,7 @@
               <a:buChar char=""/>
             </a:pPr>
             <a:r>
-              <a:rPr lang="en-US" sz="1800" b="0" strike="noStrike" spc="-1">
+              <a:rPr lang="en-US" sz="1800" b="0" strike="noStrike" spc="-1" dirty="0">
                 <a:latin typeface="Arial"/>
               </a:rPr>
               <a:t>Project information </a:t>

</xml_diff>